<commit_message>
Fix Grammar error in PP
</commit_message>
<xml_diff>
--- a/Team4_EDA_Presentation_Celia-Ryan-Akib.pptx
+++ b/Team4_EDA_Presentation_Celia-Ryan-Akib.pptx
@@ -5954,7 +5954,21 @@
                 <a:latin typeface="Adobe Devanagari" panose="02040503050201020203" pitchFamily="18" charset="0"/>
                 <a:cs typeface="Adobe Devanagari" panose="02040503050201020203" pitchFamily="18" charset="0"/>
               </a:rPr>
-              <a:t>Only data that required the comparison of ABV to IBU had observations with the value of &lt;NA&gt; for those values were dropped </a:t>
+              <a:t>Only data that required the comparison of ABV to IBU had observations with the value of &lt;</a:t>
+            </a:r>
+            <a:r>
+              <a:rPr lang="en-US" sz="2600">
+                <a:latin typeface="Adobe Devanagari" panose="02040503050201020203" pitchFamily="18" charset="0"/>
+                <a:cs typeface="Adobe Devanagari" panose="02040503050201020203" pitchFamily="18" charset="0"/>
+              </a:rPr>
+              <a:t>NA&gt; </a:t>
+            </a:r>
+            <a:r>
+              <a:rPr lang="en-US" sz="2600" dirty="0">
+                <a:latin typeface="Adobe Devanagari" panose="02040503050201020203" pitchFamily="18" charset="0"/>
+                <a:cs typeface="Adobe Devanagari" panose="02040503050201020203" pitchFamily="18" charset="0"/>
+              </a:rPr>
+              <a:t>were dropped </a:t>
             </a:r>
           </a:p>
           <a:p>

</xml_diff>